<commit_message>
Updates to support Secrets Manager instead of Certificate Manager
</commit_message>
<xml_diff>
--- a/vpc-cockroachdb-mzr/docs/diagrams/cockroachdb-mzr-simple.pptx
+++ b/vpc-cockroachdb-mzr/docs/diagrams/cockroachdb-mzr-simple.pptx
@@ -199,7 +199,7 @@
           <a:p>
             <a:fld id="{269FC49B-7FA2-4222-A4A9-A2689F64D46F}" type="datetimeFigureOut">
               <a:rPr lang="en-US" smtClean="0"/>
-              <a:t>6/13/2019</a:t>
+              <a:t>3/15/2022</a:t>
             </a:fld>
             <a:endParaRPr lang="en-US"/>
           </a:p>
@@ -613,7 +613,7 @@
           <a:p>
             <a:fld id="{6C4429AE-FC00-427F-BBFD-4FD5F2979418}" type="datetimeFigureOut">
               <a:rPr lang="en-US" smtClean="0"/>
-              <a:t>6/13/2019</a:t>
+              <a:t>3/15/2022</a:t>
             </a:fld>
             <a:endParaRPr lang="en-US"/>
           </a:p>
@@ -811,7 +811,7 @@
           <a:p>
             <a:fld id="{6C4429AE-FC00-427F-BBFD-4FD5F2979418}" type="datetimeFigureOut">
               <a:rPr lang="en-US" smtClean="0"/>
-              <a:t>6/13/2019</a:t>
+              <a:t>3/15/2022</a:t>
             </a:fld>
             <a:endParaRPr lang="en-US"/>
           </a:p>
@@ -1019,7 +1019,7 @@
           <a:p>
             <a:fld id="{6C4429AE-FC00-427F-BBFD-4FD5F2979418}" type="datetimeFigureOut">
               <a:rPr lang="en-US" smtClean="0"/>
-              <a:t>6/13/2019</a:t>
+              <a:t>3/15/2022</a:t>
             </a:fld>
             <a:endParaRPr lang="en-US"/>
           </a:p>
@@ -1217,7 +1217,7 @@
           <a:p>
             <a:fld id="{6C4429AE-FC00-427F-BBFD-4FD5F2979418}" type="datetimeFigureOut">
               <a:rPr lang="en-US" smtClean="0"/>
-              <a:t>6/13/2019</a:t>
+              <a:t>3/15/2022</a:t>
             </a:fld>
             <a:endParaRPr lang="en-US"/>
           </a:p>
@@ -1492,7 +1492,7 @@
           <a:p>
             <a:fld id="{6C4429AE-FC00-427F-BBFD-4FD5F2979418}" type="datetimeFigureOut">
               <a:rPr lang="en-US" smtClean="0"/>
-              <a:t>6/13/2019</a:t>
+              <a:t>3/15/2022</a:t>
             </a:fld>
             <a:endParaRPr lang="en-US"/>
           </a:p>
@@ -1757,7 +1757,7 @@
           <a:p>
             <a:fld id="{6C4429AE-FC00-427F-BBFD-4FD5F2979418}" type="datetimeFigureOut">
               <a:rPr lang="en-US" smtClean="0"/>
-              <a:t>6/13/2019</a:t>
+              <a:t>3/15/2022</a:t>
             </a:fld>
             <a:endParaRPr lang="en-US"/>
           </a:p>
@@ -2169,7 +2169,7 @@
           <a:p>
             <a:fld id="{6C4429AE-FC00-427F-BBFD-4FD5F2979418}" type="datetimeFigureOut">
               <a:rPr lang="en-US" smtClean="0"/>
-              <a:t>6/13/2019</a:t>
+              <a:t>3/15/2022</a:t>
             </a:fld>
             <a:endParaRPr lang="en-US"/>
           </a:p>
@@ -2310,7 +2310,7 @@
           <a:p>
             <a:fld id="{6C4429AE-FC00-427F-BBFD-4FD5F2979418}" type="datetimeFigureOut">
               <a:rPr lang="en-US" smtClean="0"/>
-              <a:t>6/13/2019</a:t>
+              <a:t>3/15/2022</a:t>
             </a:fld>
             <a:endParaRPr lang="en-US"/>
           </a:p>
@@ -2423,7 +2423,7 @@
           <a:p>
             <a:fld id="{6C4429AE-FC00-427F-BBFD-4FD5F2979418}" type="datetimeFigureOut">
               <a:rPr lang="en-US" smtClean="0"/>
-              <a:t>6/13/2019</a:t>
+              <a:t>3/15/2022</a:t>
             </a:fld>
             <a:endParaRPr lang="en-US"/>
           </a:p>
@@ -2734,7 +2734,7 @@
           <a:p>
             <a:fld id="{6C4429AE-FC00-427F-BBFD-4FD5F2979418}" type="datetimeFigureOut">
               <a:rPr lang="en-US" smtClean="0"/>
-              <a:t>6/13/2019</a:t>
+              <a:t>3/15/2022</a:t>
             </a:fld>
             <a:endParaRPr lang="en-US"/>
           </a:p>
@@ -3022,7 +3022,7 @@
           <a:p>
             <a:fld id="{6C4429AE-FC00-427F-BBFD-4FD5F2979418}" type="datetimeFigureOut">
               <a:rPr lang="en-US" smtClean="0"/>
-              <a:t>6/13/2019</a:t>
+              <a:t>3/15/2022</a:t>
             </a:fld>
             <a:endParaRPr lang="en-US"/>
           </a:p>
@@ -3263,7 +3263,7 @@
           <a:p>
             <a:fld id="{6C4429AE-FC00-427F-BBFD-4FD5F2979418}" type="datetimeFigureOut">
               <a:rPr lang="en-US" smtClean="0"/>
-              <a:t>6/13/2019</a:t>
+              <a:t>3/15/2022</a:t>
             </a:fld>
             <a:endParaRPr lang="en-US"/>
           </a:p>
@@ -5497,7 +5497,7 @@
         <p:spPr>
           <a:xfrm>
             <a:off x="8171988" y="2743744"/>
-            <a:ext cx="1838966" cy="1569186"/>
+            <a:ext cx="1838966" cy="921650"/>
           </a:xfrm>
           <a:prstGeom prst="roundRect">
             <a:avLst/>
@@ -5656,216 +5656,6 @@
             </a:p>
           </p:txBody>
         </p:sp>
-      </p:grpSp>
-      <p:sp>
-        <p:nvSpPr>
-          <p:cNvPr id="286" name="Object 20">
-            <a:extLst>
-              <a:ext uri="{FF2B5EF4-FFF2-40B4-BE49-F238E27FC236}">
-                <a16:creationId xmlns:a16="http://schemas.microsoft.com/office/drawing/2014/main" id="{B502C058-95BF-4544-B8C9-6B4D3E2C5F99}"/>
-              </a:ext>
-            </a:extLst>
-          </p:cNvPr>
-          <p:cNvSpPr/>
-          <p:nvPr/>
-        </p:nvSpPr>
-        <p:spPr>
-          <a:xfrm>
-            <a:off x="9295785" y="2830197"/>
-            <a:ext cx="457200" cy="457200"/>
-          </a:xfrm>
-          <a:prstGeom prst="ellipse">
-            <a:avLst/>
-          </a:prstGeom>
-          <a:solidFill>
-            <a:srgbClr val="FFFFFF"/>
-          </a:solidFill>
-          <a:ln w="19050">
-            <a:solidFill>
-              <a:srgbClr val="646365"/>
-            </a:solidFill>
-            <a:prstDash val="solid"/>
-          </a:ln>
-        </p:spPr>
-      </p:sp>
-      <p:grpSp>
-        <p:nvGrpSpPr>
-          <p:cNvPr id="35" name="Group 34">
-            <a:extLst>
-              <a:ext uri="{FF2B5EF4-FFF2-40B4-BE49-F238E27FC236}">
-                <a16:creationId xmlns:a16="http://schemas.microsoft.com/office/drawing/2014/main" id="{FD4DC989-6EC3-475C-AD6C-4A69F493A764}"/>
-              </a:ext>
-            </a:extLst>
-          </p:cNvPr>
-          <p:cNvGrpSpPr/>
-          <p:nvPr/>
-        </p:nvGrpSpPr>
-        <p:grpSpPr>
-          <a:xfrm>
-            <a:off x="9204345" y="2921637"/>
-            <a:ext cx="640080" cy="685800"/>
-            <a:chOff x="9316215" y="3637848"/>
-            <a:chExt cx="640080" cy="685800"/>
-          </a:xfrm>
-        </p:grpSpPr>
-        <p:pic>
-          <p:nvPicPr>
-            <p:cNvPr id="287" name="Object 21" descr="public/generated/icons/AlertNotification-8d3cff7f-bb94-1444678145000.png">
-              <a:extLst>
-                <a:ext uri="{FF2B5EF4-FFF2-40B4-BE49-F238E27FC236}">
-                  <a16:creationId xmlns:a16="http://schemas.microsoft.com/office/drawing/2014/main" id="{653016E5-9C5E-42A7-B7B0-38BA2822C0D9}"/>
-                </a:ext>
-              </a:extLst>
-            </p:cNvPr>
-            <p:cNvPicPr>
-              <a:picLocks noChangeAspect="1"/>
-            </p:cNvPicPr>
-            <p:nvPr/>
-          </p:nvPicPr>
-          <p:blipFill>
-            <a:blip r:embed="rId11"/>
-            <a:stretch>
-              <a:fillRect/>
-            </a:stretch>
-          </p:blipFill>
-          <p:spPr>
-            <a:xfrm>
-              <a:off x="9499095" y="3637848"/>
-              <a:ext cx="274320" cy="274320"/>
-            </a:xfrm>
-            <a:prstGeom prst="rect">
-              <a:avLst/>
-            </a:prstGeom>
-          </p:spPr>
-        </p:pic>
-        <p:sp>
-          <p:nvSpPr>
-            <p:cNvPr id="288" name="Object 22">
-              <a:extLst>
-                <a:ext uri="{FF2B5EF4-FFF2-40B4-BE49-F238E27FC236}">
-                  <a16:creationId xmlns:a16="http://schemas.microsoft.com/office/drawing/2014/main" id="{4DA125D7-8492-4363-A32D-6D3344E2E7AD}"/>
-                </a:ext>
-              </a:extLst>
-            </p:cNvPr>
-            <p:cNvSpPr/>
-            <p:nvPr/>
-          </p:nvSpPr>
-          <p:spPr>
-            <a:xfrm>
-              <a:off x="9316215" y="4049328"/>
-              <a:ext cx="640080" cy="274320"/>
-            </a:xfrm>
-            <a:prstGeom prst="rect">
-              <a:avLst/>
-            </a:prstGeom>
-            <a:noFill/>
-          </p:spPr>
-          <p:txBody>
-            <a:bodyPr wrap="square" lIns="0" tIns="0" rIns="0" bIns="0" rtlCol="0" anchor="t">
-              <a:spAutoFit/>
-            </a:bodyPr>
-            <a:lstStyle/>
-            <a:p>
-              <a:pPr algn="ctr">
-                <a:buNone/>
-              </a:pPr>
-              <a:r>
-                <a:rPr lang="en-US" sz="600" b="1" dirty="0">
-                  <a:solidFill>
-                    <a:srgbClr val="646365"/>
-                  </a:solidFill>
-                  <a:latin typeface="Helvetica" pitchFamily="34" charset="0"/>
-                  <a:ea typeface="Helvetica" pitchFamily="34" charset="-122"/>
-                  <a:cs typeface="Helvetica" pitchFamily="34" charset="-120"/>
-                </a:rPr>
-                <a:t>ALERT NOTIFICATION</a:t>
-              </a:r>
-              <a:endParaRPr lang="en-US" dirty="0"/>
-            </a:p>
-          </p:txBody>
-        </p:sp>
-      </p:grpSp>
-      <p:grpSp>
-        <p:nvGrpSpPr>
-          <p:cNvPr id="9" name="Group 8">
-            <a:extLst>
-              <a:ext uri="{FF2B5EF4-FFF2-40B4-BE49-F238E27FC236}">
-                <a16:creationId xmlns:a16="http://schemas.microsoft.com/office/drawing/2014/main" id="{3B7E0A3F-B58F-43F2-ADB7-8D2B6BA39D67}"/>
-              </a:ext>
-            </a:extLst>
-          </p:cNvPr>
-          <p:cNvGrpSpPr/>
-          <p:nvPr/>
-        </p:nvGrpSpPr>
-        <p:grpSpPr>
-          <a:xfrm>
-            <a:off x="7959421" y="2562166"/>
-            <a:ext cx="457200" cy="457200"/>
-            <a:chOff x="9082031" y="2681918"/>
-            <a:chExt cx="457200" cy="457200"/>
-          </a:xfrm>
-        </p:grpSpPr>
-        <p:sp>
-          <p:nvSpPr>
-            <p:cNvPr id="233" name="Object 92">
-              <a:extLst>
-                <a:ext uri="{FF2B5EF4-FFF2-40B4-BE49-F238E27FC236}">
-                  <a16:creationId xmlns:a16="http://schemas.microsoft.com/office/drawing/2014/main" id="{A41F67CC-3EBB-4C9A-9FED-3FC23309CA13}"/>
-                </a:ext>
-              </a:extLst>
-            </p:cNvPr>
-            <p:cNvSpPr/>
-            <p:nvPr/>
-          </p:nvSpPr>
-          <p:spPr>
-            <a:xfrm>
-              <a:off x="9082031" y="2681918"/>
-              <a:ext cx="457200" cy="457200"/>
-            </a:xfrm>
-            <a:prstGeom prst="ellipse">
-              <a:avLst/>
-            </a:prstGeom>
-            <a:solidFill>
-              <a:srgbClr val="FFFFFF"/>
-            </a:solidFill>
-            <a:ln w="19050">
-              <a:solidFill>
-                <a:srgbClr val="646365"/>
-              </a:solidFill>
-              <a:prstDash val="solid"/>
-            </a:ln>
-          </p:spPr>
-        </p:sp>
-        <p:pic>
-          <p:nvPicPr>
-            <p:cNvPr id="251" name="Object 93" descr="public/generated/icons/cc56b926-cfa1-4f50-ab9d-01986ff692be.png">
-              <a:extLst>
-                <a:ext uri="{FF2B5EF4-FFF2-40B4-BE49-F238E27FC236}">
-                  <a16:creationId xmlns:a16="http://schemas.microsoft.com/office/drawing/2014/main" id="{B278BB87-3AC1-423B-A4CE-2918030EE3E4}"/>
-                </a:ext>
-              </a:extLst>
-            </p:cNvPr>
-            <p:cNvPicPr>
-              <a:picLocks noChangeAspect="1"/>
-            </p:cNvPicPr>
-            <p:nvPr/>
-          </p:nvPicPr>
-          <p:blipFill>
-            <a:blip r:embed="rId12"/>
-            <a:stretch>
-              <a:fillRect/>
-            </a:stretch>
-          </p:blipFill>
-          <p:spPr>
-            <a:xfrm>
-              <a:off x="9173471" y="2773358"/>
-              <a:ext cx="274320" cy="274320"/>
-            </a:xfrm>
-            <a:prstGeom prst="rect">
-              <a:avLst/>
-            </a:prstGeom>
-          </p:spPr>
-        </p:pic>
       </p:grpSp>
       <p:sp>
         <p:nvSpPr>
@@ -6108,7 +5898,7 @@
             <p:nvPr/>
           </p:nvPicPr>
           <p:blipFill>
-            <a:blip r:embed="rId13"/>
+            <a:blip r:embed="rId11"/>
             <a:stretch>
               <a:fillRect/>
             </a:stretch>
@@ -6139,7 +5929,7 @@
           <p:nvPr/>
         </p:nvPicPr>
         <p:blipFill>
-          <a:blip r:embed="rId14"/>
+          <a:blip r:embed="rId12"/>
           <a:stretch>
             <a:fillRect/>
           </a:stretch>
@@ -7212,7 +7002,7 @@
             <p:nvPr/>
           </p:nvPicPr>
           <p:blipFill>
-            <a:blip r:embed="rId15"/>
+            <a:blip r:embed="rId13"/>
             <a:stretch>
               <a:fillRect/>
             </a:stretch>
@@ -7350,7 +7140,7 @@
         </p:nvSpPr>
         <p:spPr>
           <a:xfrm>
-            <a:off x="8653107" y="4382132"/>
+            <a:off x="8680794" y="3731373"/>
             <a:ext cx="965157" cy="184666"/>
           </a:xfrm>
           <a:prstGeom prst="rect">
@@ -7376,7 +7166,7 @@
                 <a:ea typeface="Helvetica" pitchFamily="34" charset="-122"/>
                 <a:cs typeface="Helvetica" pitchFamily="34" charset="-120"/>
               </a:rPr>
-              <a:t>CERTIFICATE MANAGER SERVICES</a:t>
+              <a:t>SECRETS MANAGER SERVICES</a:t>
             </a:r>
             <a:endParaRPr lang="en-US" dirty="0"/>
           </a:p>
@@ -7523,7 +7313,7 @@
         </p:nvGrpSpPr>
         <p:grpSpPr>
           <a:xfrm>
-            <a:off x="8405110" y="3567433"/>
+            <a:off x="9227511" y="2852640"/>
             <a:ext cx="640080" cy="777240"/>
             <a:chOff x="182880" y="1371600"/>
             <a:chExt cx="640080" cy="777240"/>
@@ -7575,7 +7365,7 @@
             <p:nvPr/>
           </p:nvPicPr>
           <p:blipFill>
-            <a:blip r:embed="rId16"/>
+            <a:blip r:embed="rId14"/>
             <a:stretch>
               <a:fillRect/>
             </a:stretch>
@@ -9673,7 +9463,7 @@
             <p:nvPr/>
           </p:nvPicPr>
           <p:blipFill>
-            <a:blip r:embed="rId17"/>
+            <a:blip r:embed="rId15"/>
             <a:stretch>
               <a:fillRect/>
             </a:stretch>
@@ -9991,7 +9781,7 @@
             <p:nvPr/>
           </p:nvPicPr>
           <p:blipFill>
-            <a:blip r:embed="rId15"/>
+            <a:blip r:embed="rId13"/>
             <a:stretch>
               <a:fillRect/>
             </a:stretch>
@@ -10554,7 +10344,7 @@
             <p:nvPr/>
           </p:nvPicPr>
           <p:blipFill>
-            <a:blip r:embed="rId18"/>
+            <a:blip r:embed="rId16"/>
             <a:stretch>
               <a:fillRect/>
             </a:stretch>
@@ -10651,7 +10441,7 @@
             <p:nvPr/>
           </p:nvPicPr>
           <p:blipFill>
-            <a:blip r:embed="rId18"/>
+            <a:blip r:embed="rId16"/>
             <a:stretch>
               <a:fillRect/>
             </a:stretch>
@@ -10799,6 +10589,95 @@
           </a:fontRef>
         </p:style>
       </p:cxnSp>
+      <p:grpSp>
+        <p:nvGrpSpPr>
+          <p:cNvPr id="2" name="Group 1">
+            <a:extLst>
+              <a:ext uri="{FF2B5EF4-FFF2-40B4-BE49-F238E27FC236}">
+                <a16:creationId xmlns:a16="http://schemas.microsoft.com/office/drawing/2014/main" id="{B9721EFE-5E10-4DD5-BF31-7D6FDD9F3F5E}"/>
+              </a:ext>
+            </a:extLst>
+          </p:cNvPr>
+          <p:cNvGrpSpPr/>
+          <p:nvPr/>
+        </p:nvGrpSpPr>
+        <p:grpSpPr>
+          <a:xfrm>
+            <a:off x="8009981" y="2579560"/>
+            <a:ext cx="457200" cy="457200"/>
+            <a:chOff x="7141131" y="5696502"/>
+            <a:chExt cx="457200" cy="457200"/>
+          </a:xfrm>
+        </p:grpSpPr>
+        <p:sp>
+          <p:nvSpPr>
+            <p:cNvPr id="201" name="Object 100">
+              <a:extLst>
+                <a:ext uri="{FF2B5EF4-FFF2-40B4-BE49-F238E27FC236}">
+                  <a16:creationId xmlns:a16="http://schemas.microsoft.com/office/drawing/2014/main" id="{7E842A40-5E46-478D-81F8-94A4B8BFFBC4}"/>
+                </a:ext>
+              </a:extLst>
+            </p:cNvPr>
+            <p:cNvSpPr/>
+            <p:nvPr/>
+          </p:nvSpPr>
+          <p:spPr>
+            <a:xfrm>
+              <a:off x="7141131" y="5696502"/>
+              <a:ext cx="457200" cy="457200"/>
+            </a:xfrm>
+            <a:prstGeom prst="ellipse">
+              <a:avLst/>
+            </a:prstGeom>
+            <a:solidFill>
+              <a:srgbClr val="FFFFFF"/>
+            </a:solidFill>
+            <a:ln w="19050">
+              <a:solidFill>
+                <a:srgbClr val="646365"/>
+              </a:solidFill>
+              <a:prstDash val="solid"/>
+            </a:ln>
+          </p:spPr>
+          <p:txBody>
+            <a:bodyPr/>
+            <a:lstStyle/>
+            <a:p>
+              <a:endParaRPr lang="en-US"/>
+            </a:p>
+          </p:txBody>
+        </p:sp>
+        <p:pic>
+          <p:nvPicPr>
+            <p:cNvPr id="204" name="Object 101">
+              <a:extLst>
+                <a:ext uri="{FF2B5EF4-FFF2-40B4-BE49-F238E27FC236}">
+                  <a16:creationId xmlns:a16="http://schemas.microsoft.com/office/drawing/2014/main" id="{16A9AEF4-1755-4B9D-972F-56D1776E6FBA}"/>
+                </a:ext>
+              </a:extLst>
+            </p:cNvPr>
+            <p:cNvPicPr>
+              <a:picLocks noChangeAspect="1"/>
+            </p:cNvPicPr>
+            <p:nvPr/>
+          </p:nvPicPr>
+          <p:blipFill>
+            <a:blip r:embed="rId17"/>
+            <a:stretch>
+              <a:fillRect/>
+            </a:stretch>
+          </p:blipFill>
+          <p:spPr>
+            <a:xfrm>
+              <a:off x="7232571" y="5787942"/>
+              <a:ext cx="274320" cy="274320"/>
+            </a:xfrm>
+            <a:prstGeom prst="rect">
+              <a:avLst/>
+            </a:prstGeom>
+          </p:spPr>
+        </p:pic>
+      </p:grpSp>
     </p:spTree>
     <p:extLst>
       <p:ext uri="{BB962C8B-B14F-4D97-AF65-F5344CB8AC3E}">
@@ -14080,10 +13959,10 @@
       </p:grpSp>
       <p:sp>
         <p:nvSpPr>
-          <p:cNvPr id="145" name="Rectangle: Rounded Corners 144">
-            <a:extLst>
-              <a:ext uri="{FF2B5EF4-FFF2-40B4-BE49-F238E27FC236}">
-                <a16:creationId xmlns:a16="http://schemas.microsoft.com/office/drawing/2014/main" id="{C2DC7085-F235-4012-98E0-18E8D3216AD2}"/>
+          <p:cNvPr id="138" name="Rectangle: Rounded Corners 137">
+            <a:extLst>
+              <a:ext uri="{FF2B5EF4-FFF2-40B4-BE49-F238E27FC236}">
+                <a16:creationId xmlns:a16="http://schemas.microsoft.com/office/drawing/2014/main" id="{D6F1BC6C-DDC9-4099-9BE1-F87270F6D126}"/>
               </a:ext>
             </a:extLst>
           </p:cNvPr>
@@ -14092,8 +13971,8 @@
         </p:nvSpPr>
         <p:spPr>
           <a:xfrm>
-            <a:off x="6943045" y="2568005"/>
-            <a:ext cx="1838966" cy="1569186"/>
+            <a:off x="6926505" y="2597606"/>
+            <a:ext cx="1838966" cy="921650"/>
           </a:xfrm>
           <a:prstGeom prst="roundRect">
             <a:avLst/>
@@ -14127,10 +14006,10 @@
       </p:sp>
       <p:grpSp>
         <p:nvGrpSpPr>
-          <p:cNvPr id="156" name="Group 155">
-            <a:extLst>
-              <a:ext uri="{FF2B5EF4-FFF2-40B4-BE49-F238E27FC236}">
-                <a16:creationId xmlns:a16="http://schemas.microsoft.com/office/drawing/2014/main" id="{7FC855ED-17DE-4604-9BF1-9E87DB5C339F}"/>
+          <p:cNvPr id="173" name="Group 172">
+            <a:extLst>
+              <a:ext uri="{FF2B5EF4-FFF2-40B4-BE49-F238E27FC236}">
+                <a16:creationId xmlns:a16="http://schemas.microsoft.com/office/drawing/2014/main" id="{B7630BCF-E107-4E0B-9E47-389215102CFB}"/>
               </a:ext>
             </a:extLst>
           </p:cNvPr>
@@ -14139,7 +14018,7 @@
         </p:nvGrpSpPr>
         <p:grpSpPr>
           <a:xfrm>
-            <a:off x="7176167" y="2673646"/>
+            <a:off x="7159627" y="2703247"/>
             <a:ext cx="640080" cy="777240"/>
             <a:chOff x="7900278" y="3572277"/>
             <a:chExt cx="640080" cy="777240"/>
@@ -14147,10 +14026,10 @@
         </p:grpSpPr>
         <p:sp>
           <p:nvSpPr>
-            <p:cNvPr id="157" name="Object 70">
+            <p:cNvPr id="174" name="Object 70">
               <a:extLst>
                 <a:ext uri="{FF2B5EF4-FFF2-40B4-BE49-F238E27FC236}">
-                  <a16:creationId xmlns:a16="http://schemas.microsoft.com/office/drawing/2014/main" id="{0022AA7E-3313-472F-9550-2BF87E4A99DC}"/>
+                  <a16:creationId xmlns:a16="http://schemas.microsoft.com/office/drawing/2014/main" id="{E846E177-5977-4C39-917B-80B28032F8B4}"/>
                 </a:ext>
               </a:extLst>
             </p:cNvPr>
@@ -14178,10 +14057,10 @@
         </p:sp>
         <p:pic>
           <p:nvPicPr>
-            <p:cNvPr id="158" name="Object 71" descr="icons/namedsvg/API.png">
+            <p:cNvPr id="175" name="Object 71" descr="icons/namedsvg/API.png">
               <a:extLst>
                 <a:ext uri="{FF2B5EF4-FFF2-40B4-BE49-F238E27FC236}">
-                  <a16:creationId xmlns:a16="http://schemas.microsoft.com/office/drawing/2014/main" id="{1993AC55-868C-4423-8966-800CEC16FF87}"/>
+                  <a16:creationId xmlns:a16="http://schemas.microsoft.com/office/drawing/2014/main" id="{9F03341F-CE2F-4A92-A026-7D044DAF020D}"/>
                 </a:ext>
               </a:extLst>
             </p:cNvPr>
@@ -14208,10 +14087,10 @@
         </p:pic>
         <p:sp>
           <p:nvSpPr>
-            <p:cNvPr id="159" name="Object 72">
+            <p:cNvPr id="176" name="Object 72">
               <a:extLst>
                 <a:ext uri="{FF2B5EF4-FFF2-40B4-BE49-F238E27FC236}">
-                  <a16:creationId xmlns:a16="http://schemas.microsoft.com/office/drawing/2014/main" id="{5774B5D6-4FF5-4EA7-AC92-14F17C8D8ECD}"/>
+                  <a16:creationId xmlns:a16="http://schemas.microsoft.com/office/drawing/2014/main" id="{1FE26D36-8B39-426B-AC60-C1D5225F81C8}"/>
                 </a:ext>
               </a:extLst>
             </p:cNvPr>
@@ -14255,10 +14134,10 @@
       </p:grpSp>
       <p:sp>
         <p:nvSpPr>
-          <p:cNvPr id="160" name="Object 20">
-            <a:extLst>
-              <a:ext uri="{FF2B5EF4-FFF2-40B4-BE49-F238E27FC236}">
-                <a16:creationId xmlns:a16="http://schemas.microsoft.com/office/drawing/2014/main" id="{955BA9BB-3044-4107-B304-F692FB5EA86E}"/>
+          <p:cNvPr id="177" name="Object 47">
+            <a:extLst>
+              <a:ext uri="{FF2B5EF4-FFF2-40B4-BE49-F238E27FC236}">
+                <a16:creationId xmlns:a16="http://schemas.microsoft.com/office/drawing/2014/main" id="{CD17E7E4-95C5-4EF0-B614-C017A41CB203}"/>
               </a:ext>
             </a:extLst>
           </p:cNvPr>
@@ -14267,217 +14146,7 @@
         </p:nvSpPr>
         <p:spPr>
           <a:xfrm>
-            <a:off x="8066842" y="2654458"/>
-            <a:ext cx="457200" cy="457200"/>
-          </a:xfrm>
-          <a:prstGeom prst="ellipse">
-            <a:avLst/>
-          </a:prstGeom>
-          <a:solidFill>
-            <a:srgbClr val="FFFFFF"/>
-          </a:solidFill>
-          <a:ln w="19050">
-            <a:solidFill>
-              <a:srgbClr val="646365"/>
-            </a:solidFill>
-            <a:prstDash val="solid"/>
-          </a:ln>
-        </p:spPr>
-      </p:sp>
-      <p:grpSp>
-        <p:nvGrpSpPr>
-          <p:cNvPr id="161" name="Group 160">
-            <a:extLst>
-              <a:ext uri="{FF2B5EF4-FFF2-40B4-BE49-F238E27FC236}">
-                <a16:creationId xmlns:a16="http://schemas.microsoft.com/office/drawing/2014/main" id="{7CAAB746-55AB-4BD6-8621-A3C7D0C8ED7C}"/>
-              </a:ext>
-            </a:extLst>
-          </p:cNvPr>
-          <p:cNvGrpSpPr/>
-          <p:nvPr/>
-        </p:nvGrpSpPr>
-        <p:grpSpPr>
-          <a:xfrm>
-            <a:off x="7975402" y="2745898"/>
-            <a:ext cx="640080" cy="685800"/>
-            <a:chOff x="9316215" y="3637848"/>
-            <a:chExt cx="640080" cy="685800"/>
-          </a:xfrm>
-        </p:grpSpPr>
-        <p:pic>
-          <p:nvPicPr>
-            <p:cNvPr id="162" name="Object 21" descr="public/generated/icons/AlertNotification-8d3cff7f-bb94-1444678145000.png">
-              <a:extLst>
-                <a:ext uri="{FF2B5EF4-FFF2-40B4-BE49-F238E27FC236}">
-                  <a16:creationId xmlns:a16="http://schemas.microsoft.com/office/drawing/2014/main" id="{AE37A170-7704-4563-96E1-7F54B15F6A0A}"/>
-                </a:ext>
-              </a:extLst>
-            </p:cNvPr>
-            <p:cNvPicPr>
-              <a:picLocks noChangeAspect="1"/>
-            </p:cNvPicPr>
-            <p:nvPr/>
-          </p:nvPicPr>
-          <p:blipFill>
-            <a:blip r:embed="rId14"/>
-            <a:stretch>
-              <a:fillRect/>
-            </a:stretch>
-          </p:blipFill>
-          <p:spPr>
-            <a:xfrm>
-              <a:off x="9499095" y="3637848"/>
-              <a:ext cx="274320" cy="274320"/>
-            </a:xfrm>
-            <a:prstGeom prst="rect">
-              <a:avLst/>
-            </a:prstGeom>
-          </p:spPr>
-        </p:pic>
-        <p:sp>
-          <p:nvSpPr>
-            <p:cNvPr id="163" name="Object 22">
-              <a:extLst>
-                <a:ext uri="{FF2B5EF4-FFF2-40B4-BE49-F238E27FC236}">
-                  <a16:creationId xmlns:a16="http://schemas.microsoft.com/office/drawing/2014/main" id="{36972CEA-F668-4A24-A50D-26D201E32EE6}"/>
-                </a:ext>
-              </a:extLst>
-            </p:cNvPr>
-            <p:cNvSpPr/>
-            <p:nvPr/>
-          </p:nvSpPr>
-          <p:spPr>
-            <a:xfrm>
-              <a:off x="9316215" y="4049328"/>
-              <a:ext cx="640080" cy="274320"/>
-            </a:xfrm>
-            <a:prstGeom prst="rect">
-              <a:avLst/>
-            </a:prstGeom>
-            <a:noFill/>
-          </p:spPr>
-          <p:txBody>
-            <a:bodyPr wrap="square" lIns="0" tIns="0" rIns="0" bIns="0" rtlCol="0" anchor="t">
-              <a:spAutoFit/>
-            </a:bodyPr>
-            <a:lstStyle/>
-            <a:p>
-              <a:pPr algn="ctr">
-                <a:buNone/>
-              </a:pPr>
-              <a:r>
-                <a:rPr lang="en-US" sz="600" b="1" dirty="0">
-                  <a:solidFill>
-                    <a:srgbClr val="646365"/>
-                  </a:solidFill>
-                  <a:latin typeface="Helvetica" pitchFamily="34" charset="0"/>
-                  <a:ea typeface="Helvetica" pitchFamily="34" charset="-122"/>
-                  <a:cs typeface="Helvetica" pitchFamily="34" charset="-120"/>
-                </a:rPr>
-                <a:t>ALERT NOTIFICATION</a:t>
-              </a:r>
-              <a:endParaRPr lang="en-US" dirty="0"/>
-            </a:p>
-          </p:txBody>
-        </p:sp>
-      </p:grpSp>
-      <p:grpSp>
-        <p:nvGrpSpPr>
-          <p:cNvPr id="164" name="Group 163">
-            <a:extLst>
-              <a:ext uri="{FF2B5EF4-FFF2-40B4-BE49-F238E27FC236}">
-                <a16:creationId xmlns:a16="http://schemas.microsoft.com/office/drawing/2014/main" id="{FA0761C1-C141-479F-8BC4-6178BDB97D26}"/>
-              </a:ext>
-            </a:extLst>
-          </p:cNvPr>
-          <p:cNvGrpSpPr/>
-          <p:nvPr/>
-        </p:nvGrpSpPr>
-        <p:grpSpPr>
-          <a:xfrm>
-            <a:off x="6730478" y="2386427"/>
-            <a:ext cx="457200" cy="457200"/>
-            <a:chOff x="9082031" y="2681918"/>
-            <a:chExt cx="457200" cy="457200"/>
-          </a:xfrm>
-        </p:grpSpPr>
-        <p:sp>
-          <p:nvSpPr>
-            <p:cNvPr id="165" name="Object 92">
-              <a:extLst>
-                <a:ext uri="{FF2B5EF4-FFF2-40B4-BE49-F238E27FC236}">
-                  <a16:creationId xmlns:a16="http://schemas.microsoft.com/office/drawing/2014/main" id="{4D272CB2-9EB1-4079-A9E2-DF59BB144E52}"/>
-                </a:ext>
-              </a:extLst>
-            </p:cNvPr>
-            <p:cNvSpPr/>
-            <p:nvPr/>
-          </p:nvSpPr>
-          <p:spPr>
-            <a:xfrm>
-              <a:off x="9082031" y="2681918"/>
-              <a:ext cx="457200" cy="457200"/>
-            </a:xfrm>
-            <a:prstGeom prst="ellipse">
-              <a:avLst/>
-            </a:prstGeom>
-            <a:solidFill>
-              <a:srgbClr val="FFFFFF"/>
-            </a:solidFill>
-            <a:ln w="19050">
-              <a:solidFill>
-                <a:srgbClr val="646365"/>
-              </a:solidFill>
-              <a:prstDash val="solid"/>
-            </a:ln>
-          </p:spPr>
-        </p:sp>
-        <p:pic>
-          <p:nvPicPr>
-            <p:cNvPr id="166" name="Object 93" descr="public/generated/icons/cc56b926-cfa1-4f50-ab9d-01986ff692be.png">
-              <a:extLst>
-                <a:ext uri="{FF2B5EF4-FFF2-40B4-BE49-F238E27FC236}">
-                  <a16:creationId xmlns:a16="http://schemas.microsoft.com/office/drawing/2014/main" id="{00AD0C22-775B-446D-A3E1-79F6F280DB14}"/>
-                </a:ext>
-              </a:extLst>
-            </p:cNvPr>
-            <p:cNvPicPr>
-              <a:picLocks noChangeAspect="1"/>
-            </p:cNvPicPr>
-            <p:nvPr/>
-          </p:nvPicPr>
-          <p:blipFill>
-            <a:blip r:embed="rId15"/>
-            <a:stretch>
-              <a:fillRect/>
-            </a:stretch>
-          </p:blipFill>
-          <p:spPr>
-            <a:xfrm>
-              <a:off x="9173471" y="2773358"/>
-              <a:ext cx="274320" cy="274320"/>
-            </a:xfrm>
-            <a:prstGeom prst="rect">
-              <a:avLst/>
-            </a:prstGeom>
-          </p:spPr>
-        </p:pic>
-      </p:grpSp>
-      <p:sp>
-        <p:nvSpPr>
-          <p:cNvPr id="167" name="Object 47">
-            <a:extLst>
-              <a:ext uri="{FF2B5EF4-FFF2-40B4-BE49-F238E27FC236}">
-                <a16:creationId xmlns:a16="http://schemas.microsoft.com/office/drawing/2014/main" id="{3CCF10F2-3509-49BD-A562-37349182BA04}"/>
-              </a:ext>
-            </a:extLst>
-          </p:cNvPr>
-          <p:cNvSpPr/>
-          <p:nvPr/>
-        </p:nvSpPr>
-        <p:spPr>
-          <a:xfrm>
-            <a:off x="7424164" y="4206393"/>
+            <a:off x="7435311" y="3585235"/>
             <a:ext cx="965157" cy="184666"/>
           </a:xfrm>
           <a:prstGeom prst="rect">
@@ -14503,7 +14172,7 @@
                 <a:ea typeface="Helvetica" pitchFamily="34" charset="-122"/>
                 <a:cs typeface="Helvetica" pitchFamily="34" charset="-120"/>
               </a:rPr>
-              <a:t>CERTIFICATE MANAGER SERVICES</a:t>
+              <a:t>SECRETS MANAGER SERVICES</a:t>
             </a:r>
             <a:endParaRPr lang="en-US" dirty="0"/>
           </a:p>
@@ -14511,10 +14180,10 @@
       </p:sp>
       <p:grpSp>
         <p:nvGrpSpPr>
-          <p:cNvPr id="168" name="Group 167">
-            <a:extLst>
-              <a:ext uri="{FF2B5EF4-FFF2-40B4-BE49-F238E27FC236}">
-                <a16:creationId xmlns:a16="http://schemas.microsoft.com/office/drawing/2014/main" id="{FFE82136-6ABC-4DED-B233-ACBAFB2A3DB0}"/>
+          <p:cNvPr id="178" name="Group 177">
+            <a:extLst>
+              <a:ext uri="{FF2B5EF4-FFF2-40B4-BE49-F238E27FC236}">
+                <a16:creationId xmlns:a16="http://schemas.microsoft.com/office/drawing/2014/main" id="{F2CC61B1-1A08-4281-A037-E748F6A719A0}"/>
               </a:ext>
             </a:extLst>
           </p:cNvPr>
@@ -14523,7 +14192,7 @@
         </p:nvGrpSpPr>
         <p:grpSpPr>
           <a:xfrm>
-            <a:off x="7176167" y="3391694"/>
+            <a:off x="7982028" y="2706502"/>
             <a:ext cx="640080" cy="777240"/>
             <a:chOff x="182880" y="1371600"/>
             <a:chExt cx="640080" cy="777240"/>
@@ -14531,10 +14200,10 @@
         </p:grpSpPr>
         <p:sp>
           <p:nvSpPr>
-            <p:cNvPr id="170" name="Object 28">
+            <p:cNvPr id="179" name="Object 28">
               <a:extLst>
                 <a:ext uri="{FF2B5EF4-FFF2-40B4-BE49-F238E27FC236}">
-                  <a16:creationId xmlns:a16="http://schemas.microsoft.com/office/drawing/2014/main" id="{17F7BABD-3A48-417E-9CB3-2E36415BF6CA}"/>
+                  <a16:creationId xmlns:a16="http://schemas.microsoft.com/office/drawing/2014/main" id="{94E91931-32F4-4818-A3D8-21D1333B8040}"/>
                 </a:ext>
               </a:extLst>
             </p:cNvPr>
@@ -14562,10 +14231,10 @@
         </p:sp>
         <p:pic>
           <p:nvPicPr>
-            <p:cNvPr id="171" name="Object 29" descr="public/generated/icons/19.png">
+            <p:cNvPr id="180" name="Object 29" descr="public/generated/icons/19.png">
               <a:extLst>
                 <a:ext uri="{FF2B5EF4-FFF2-40B4-BE49-F238E27FC236}">
-                  <a16:creationId xmlns:a16="http://schemas.microsoft.com/office/drawing/2014/main" id="{48962B68-7472-4401-A755-279F267EF168}"/>
+                  <a16:creationId xmlns:a16="http://schemas.microsoft.com/office/drawing/2014/main" id="{6C78EEF8-AF43-4A64-BFC5-39B1CBBDF7FF}"/>
                 </a:ext>
               </a:extLst>
             </p:cNvPr>
@@ -14575,7 +14244,7 @@
             <p:nvPr/>
           </p:nvPicPr>
           <p:blipFill>
-            <a:blip r:embed="rId16"/>
+            <a:blip r:embed="rId14"/>
             <a:stretch>
               <a:fillRect/>
             </a:stretch>
@@ -14592,10 +14261,10 @@
         </p:pic>
         <p:sp>
           <p:nvSpPr>
-            <p:cNvPr id="172" name="Object 30">
+            <p:cNvPr id="181" name="Object 30">
               <a:extLst>
                 <a:ext uri="{FF2B5EF4-FFF2-40B4-BE49-F238E27FC236}">
-                  <a16:creationId xmlns:a16="http://schemas.microsoft.com/office/drawing/2014/main" id="{12165EEA-E91B-459B-BED8-9C1709F2EFBA}"/>
+                  <a16:creationId xmlns:a16="http://schemas.microsoft.com/office/drawing/2014/main" id="{5BCDD3F8-8C62-45D7-B5CA-218801F44EFB}"/>
                 </a:ext>
               </a:extLst>
             </p:cNvPr>
@@ -14636,6 +14305,95 @@
             </a:p>
           </p:txBody>
         </p:sp>
+      </p:grpSp>
+      <p:grpSp>
+        <p:nvGrpSpPr>
+          <p:cNvPr id="182" name="Group 181">
+            <a:extLst>
+              <a:ext uri="{FF2B5EF4-FFF2-40B4-BE49-F238E27FC236}">
+                <a16:creationId xmlns:a16="http://schemas.microsoft.com/office/drawing/2014/main" id="{62EFFE27-6951-461B-BE1E-3BE33111C327}"/>
+              </a:ext>
+            </a:extLst>
+          </p:cNvPr>
+          <p:cNvGrpSpPr/>
+          <p:nvPr/>
+        </p:nvGrpSpPr>
+        <p:grpSpPr>
+          <a:xfrm>
+            <a:off x="6764498" y="2433422"/>
+            <a:ext cx="457200" cy="457200"/>
+            <a:chOff x="7141131" y="5696502"/>
+            <a:chExt cx="457200" cy="457200"/>
+          </a:xfrm>
+        </p:grpSpPr>
+        <p:sp>
+          <p:nvSpPr>
+            <p:cNvPr id="183" name="Object 100">
+              <a:extLst>
+                <a:ext uri="{FF2B5EF4-FFF2-40B4-BE49-F238E27FC236}">
+                  <a16:creationId xmlns:a16="http://schemas.microsoft.com/office/drawing/2014/main" id="{32C28B35-3931-4D63-A6A0-AED1C5FDCD42}"/>
+                </a:ext>
+              </a:extLst>
+            </p:cNvPr>
+            <p:cNvSpPr/>
+            <p:nvPr/>
+          </p:nvSpPr>
+          <p:spPr>
+            <a:xfrm>
+              <a:off x="7141131" y="5696502"/>
+              <a:ext cx="457200" cy="457200"/>
+            </a:xfrm>
+            <a:prstGeom prst="ellipse">
+              <a:avLst/>
+            </a:prstGeom>
+            <a:solidFill>
+              <a:srgbClr val="FFFFFF"/>
+            </a:solidFill>
+            <a:ln w="19050">
+              <a:solidFill>
+                <a:srgbClr val="646365"/>
+              </a:solidFill>
+              <a:prstDash val="solid"/>
+            </a:ln>
+          </p:spPr>
+          <p:txBody>
+            <a:bodyPr/>
+            <a:lstStyle/>
+            <a:p>
+              <a:endParaRPr lang="en-US"/>
+            </a:p>
+          </p:txBody>
+        </p:sp>
+        <p:pic>
+          <p:nvPicPr>
+            <p:cNvPr id="184" name="Object 101">
+              <a:extLst>
+                <a:ext uri="{FF2B5EF4-FFF2-40B4-BE49-F238E27FC236}">
+                  <a16:creationId xmlns:a16="http://schemas.microsoft.com/office/drawing/2014/main" id="{49DD1882-A9DC-4FEF-9722-EE90801231D4}"/>
+                </a:ext>
+              </a:extLst>
+            </p:cNvPr>
+            <p:cNvPicPr>
+              <a:picLocks noChangeAspect="1"/>
+            </p:cNvPicPr>
+            <p:nvPr/>
+          </p:nvPicPr>
+          <p:blipFill>
+            <a:blip r:embed="rId15"/>
+            <a:stretch>
+              <a:fillRect/>
+            </a:stretch>
+          </p:blipFill>
+          <p:spPr>
+            <a:xfrm>
+              <a:off x="7232571" y="5787942"/>
+              <a:ext cx="274320" cy="274320"/>
+            </a:xfrm>
+            <a:prstGeom prst="rect">
+              <a:avLst/>
+            </a:prstGeom>
+          </p:spPr>
+        </p:pic>
       </p:grpSp>
     </p:spTree>
     <p:extLst>
@@ -15376,9 +15134,7 @@
           <p:cNvGraphicFramePr>
             <a:graphicFrameLocks noGrp="1"/>
           </p:cNvGraphicFramePr>
-          <p:nvPr>
-            <p:extLst/>
-          </p:nvPr>
+          <p:nvPr/>
         </p:nvGraphicFramePr>
         <p:xfrm>
           <a:off x="9269836" y="4494934"/>
@@ -16508,391 +16264,6 @@
       </p:cxnSp>
       <p:sp>
         <p:nvSpPr>
-          <p:cNvPr id="34" name="Rectangle: Rounded Corners 33">
-            <a:extLst>
-              <a:ext uri="{FF2B5EF4-FFF2-40B4-BE49-F238E27FC236}">
-                <a16:creationId xmlns:a16="http://schemas.microsoft.com/office/drawing/2014/main" id="{18D36194-D95D-4890-A0FA-B19E4D27238F}"/>
-              </a:ext>
-            </a:extLst>
-          </p:cNvPr>
-          <p:cNvSpPr/>
-          <p:nvPr/>
-        </p:nvSpPr>
-        <p:spPr>
-          <a:xfrm>
-            <a:off x="6961706" y="3090862"/>
-            <a:ext cx="1838966" cy="1569186"/>
-          </a:xfrm>
-          <a:prstGeom prst="roundRect">
-            <a:avLst/>
-          </a:prstGeom>
-          <a:noFill/>
-        </p:spPr>
-        <p:style>
-          <a:lnRef idx="2">
-            <a:schemeClr val="accent1">
-              <a:shade val="50000"/>
-            </a:schemeClr>
-          </a:lnRef>
-          <a:fillRef idx="1">
-            <a:schemeClr val="accent1"/>
-          </a:fillRef>
-          <a:effectRef idx="0">
-            <a:schemeClr val="accent1"/>
-          </a:effectRef>
-          <a:fontRef idx="minor">
-            <a:schemeClr val="lt1"/>
-          </a:fontRef>
-        </p:style>
-        <p:txBody>
-          <a:bodyPr rtlCol="0" anchor="ctr"/>
-          <a:lstStyle/>
-          <a:p>
-            <a:pPr algn="ctr"/>
-            <a:endParaRPr lang="en-US"/>
-          </a:p>
-        </p:txBody>
-      </p:sp>
-      <p:grpSp>
-        <p:nvGrpSpPr>
-          <p:cNvPr id="38" name="Group 37">
-            <a:extLst>
-              <a:ext uri="{FF2B5EF4-FFF2-40B4-BE49-F238E27FC236}">
-                <a16:creationId xmlns:a16="http://schemas.microsoft.com/office/drawing/2014/main" id="{038E08EB-4FCE-4AC1-A100-C271AF569307}"/>
-              </a:ext>
-            </a:extLst>
-          </p:cNvPr>
-          <p:cNvGrpSpPr/>
-          <p:nvPr/>
-        </p:nvGrpSpPr>
-        <p:grpSpPr>
-          <a:xfrm>
-            <a:off x="7194828" y="3196503"/>
-            <a:ext cx="640080" cy="777240"/>
-            <a:chOff x="7900278" y="3572277"/>
-            <a:chExt cx="640080" cy="777240"/>
-          </a:xfrm>
-        </p:grpSpPr>
-        <p:sp>
-          <p:nvSpPr>
-            <p:cNvPr id="265" name="Object 70">
-              <a:extLst>
-                <a:ext uri="{FF2B5EF4-FFF2-40B4-BE49-F238E27FC236}">
-                  <a16:creationId xmlns:a16="http://schemas.microsoft.com/office/drawing/2014/main" id="{3AF4589F-A3A2-437F-8C8F-36233CFA5E68}"/>
-                </a:ext>
-              </a:extLst>
-            </p:cNvPr>
-            <p:cNvSpPr/>
-            <p:nvPr/>
-          </p:nvSpPr>
-          <p:spPr>
-            <a:xfrm>
-              <a:off x="7991718" y="3572277"/>
-              <a:ext cx="457200" cy="457200"/>
-            </a:xfrm>
-            <a:prstGeom prst="ellipse">
-              <a:avLst/>
-            </a:prstGeom>
-            <a:solidFill>
-              <a:srgbClr val="FFFFFF"/>
-            </a:solidFill>
-            <a:ln w="19050">
-              <a:solidFill>
-                <a:srgbClr val="646365"/>
-              </a:solidFill>
-              <a:prstDash val="solid"/>
-            </a:ln>
-          </p:spPr>
-        </p:sp>
-        <p:pic>
-          <p:nvPicPr>
-            <p:cNvPr id="266" name="Object 71" descr="icons/namedsvg/API.png">
-              <a:extLst>
-                <a:ext uri="{FF2B5EF4-FFF2-40B4-BE49-F238E27FC236}">
-                  <a16:creationId xmlns:a16="http://schemas.microsoft.com/office/drawing/2014/main" id="{B877A12A-1E4C-4843-8862-E2EFB6C43388}"/>
-                </a:ext>
-              </a:extLst>
-            </p:cNvPr>
-            <p:cNvPicPr>
-              <a:picLocks noChangeAspect="1"/>
-            </p:cNvPicPr>
-            <p:nvPr/>
-          </p:nvPicPr>
-          <p:blipFill>
-            <a:blip r:embed="rId10"/>
-            <a:stretch>
-              <a:fillRect/>
-            </a:stretch>
-          </p:blipFill>
-          <p:spPr>
-            <a:xfrm>
-              <a:off x="8083158" y="3663717"/>
-              <a:ext cx="274320" cy="274320"/>
-            </a:xfrm>
-            <a:prstGeom prst="rect">
-              <a:avLst/>
-            </a:prstGeom>
-          </p:spPr>
-        </p:pic>
-        <p:sp>
-          <p:nvSpPr>
-            <p:cNvPr id="285" name="Object 72">
-              <a:extLst>
-                <a:ext uri="{FF2B5EF4-FFF2-40B4-BE49-F238E27FC236}">
-                  <a16:creationId xmlns:a16="http://schemas.microsoft.com/office/drawing/2014/main" id="{7AAFE587-43FE-46B6-96FB-8A74D23D2BD7}"/>
-                </a:ext>
-              </a:extLst>
-            </p:cNvPr>
-            <p:cNvSpPr/>
-            <p:nvPr/>
-          </p:nvSpPr>
-          <p:spPr>
-            <a:xfrm>
-              <a:off x="7900278" y="4075197"/>
-              <a:ext cx="640080" cy="274320"/>
-            </a:xfrm>
-            <a:prstGeom prst="rect">
-              <a:avLst/>
-            </a:prstGeom>
-            <a:noFill/>
-          </p:spPr>
-          <p:txBody>
-            <a:bodyPr wrap="square" lIns="0" tIns="0" rIns="0" bIns="0" rtlCol="0" anchor="t">
-              <a:spAutoFit/>
-            </a:bodyPr>
-            <a:lstStyle/>
-            <a:p>
-              <a:pPr algn="ctr">
-                <a:buNone/>
-              </a:pPr>
-              <a:r>
-                <a:rPr lang="en-US" sz="600" b="1" dirty="0">
-                  <a:solidFill>
-                    <a:srgbClr val="646365"/>
-                  </a:solidFill>
-                  <a:latin typeface="Helvetica" pitchFamily="34" charset="0"/>
-                  <a:ea typeface="Helvetica" pitchFamily="34" charset="-122"/>
-                  <a:cs typeface="Helvetica" pitchFamily="34" charset="-120"/>
-                </a:rPr>
-                <a:t>API</a:t>
-              </a:r>
-              <a:endParaRPr lang="en-US" dirty="0"/>
-            </a:p>
-          </p:txBody>
-        </p:sp>
-      </p:grpSp>
-      <p:sp>
-        <p:nvSpPr>
-          <p:cNvPr id="286" name="Object 20">
-            <a:extLst>
-              <a:ext uri="{FF2B5EF4-FFF2-40B4-BE49-F238E27FC236}">
-                <a16:creationId xmlns:a16="http://schemas.microsoft.com/office/drawing/2014/main" id="{B502C058-95BF-4544-B8C9-6B4D3E2C5F99}"/>
-              </a:ext>
-            </a:extLst>
-          </p:cNvPr>
-          <p:cNvSpPr/>
-          <p:nvPr/>
-        </p:nvSpPr>
-        <p:spPr>
-          <a:xfrm>
-            <a:off x="8085503" y="3177315"/>
-            <a:ext cx="457200" cy="457200"/>
-          </a:xfrm>
-          <a:prstGeom prst="ellipse">
-            <a:avLst/>
-          </a:prstGeom>
-          <a:solidFill>
-            <a:srgbClr val="FFFFFF"/>
-          </a:solidFill>
-          <a:ln w="19050">
-            <a:solidFill>
-              <a:srgbClr val="646365"/>
-            </a:solidFill>
-            <a:prstDash val="solid"/>
-          </a:ln>
-        </p:spPr>
-      </p:sp>
-      <p:grpSp>
-        <p:nvGrpSpPr>
-          <p:cNvPr id="35" name="Group 34">
-            <a:extLst>
-              <a:ext uri="{FF2B5EF4-FFF2-40B4-BE49-F238E27FC236}">
-                <a16:creationId xmlns:a16="http://schemas.microsoft.com/office/drawing/2014/main" id="{FD4DC989-6EC3-475C-AD6C-4A69F493A764}"/>
-              </a:ext>
-            </a:extLst>
-          </p:cNvPr>
-          <p:cNvGrpSpPr/>
-          <p:nvPr/>
-        </p:nvGrpSpPr>
-        <p:grpSpPr>
-          <a:xfrm>
-            <a:off x="7994063" y="3268755"/>
-            <a:ext cx="640080" cy="685800"/>
-            <a:chOff x="9316215" y="3637848"/>
-            <a:chExt cx="640080" cy="685800"/>
-          </a:xfrm>
-        </p:grpSpPr>
-        <p:pic>
-          <p:nvPicPr>
-            <p:cNvPr id="287" name="Object 21" descr="public/generated/icons/AlertNotification-8d3cff7f-bb94-1444678145000.png">
-              <a:extLst>
-                <a:ext uri="{FF2B5EF4-FFF2-40B4-BE49-F238E27FC236}">
-                  <a16:creationId xmlns:a16="http://schemas.microsoft.com/office/drawing/2014/main" id="{653016E5-9C5E-42A7-B7B0-38BA2822C0D9}"/>
-                </a:ext>
-              </a:extLst>
-            </p:cNvPr>
-            <p:cNvPicPr>
-              <a:picLocks noChangeAspect="1"/>
-            </p:cNvPicPr>
-            <p:nvPr/>
-          </p:nvPicPr>
-          <p:blipFill>
-            <a:blip r:embed="rId11"/>
-            <a:stretch>
-              <a:fillRect/>
-            </a:stretch>
-          </p:blipFill>
-          <p:spPr>
-            <a:xfrm>
-              <a:off x="9499095" y="3637848"/>
-              <a:ext cx="274320" cy="274320"/>
-            </a:xfrm>
-            <a:prstGeom prst="rect">
-              <a:avLst/>
-            </a:prstGeom>
-          </p:spPr>
-        </p:pic>
-        <p:sp>
-          <p:nvSpPr>
-            <p:cNvPr id="288" name="Object 22">
-              <a:extLst>
-                <a:ext uri="{FF2B5EF4-FFF2-40B4-BE49-F238E27FC236}">
-                  <a16:creationId xmlns:a16="http://schemas.microsoft.com/office/drawing/2014/main" id="{4DA125D7-8492-4363-A32D-6D3344E2E7AD}"/>
-                </a:ext>
-              </a:extLst>
-            </p:cNvPr>
-            <p:cNvSpPr/>
-            <p:nvPr/>
-          </p:nvSpPr>
-          <p:spPr>
-            <a:xfrm>
-              <a:off x="9316215" y="4049328"/>
-              <a:ext cx="640080" cy="274320"/>
-            </a:xfrm>
-            <a:prstGeom prst="rect">
-              <a:avLst/>
-            </a:prstGeom>
-            <a:noFill/>
-          </p:spPr>
-          <p:txBody>
-            <a:bodyPr wrap="square" lIns="0" tIns="0" rIns="0" bIns="0" rtlCol="0" anchor="t">
-              <a:spAutoFit/>
-            </a:bodyPr>
-            <a:lstStyle/>
-            <a:p>
-              <a:pPr algn="ctr">
-                <a:buNone/>
-              </a:pPr>
-              <a:r>
-                <a:rPr lang="en-US" sz="600" b="1" dirty="0">
-                  <a:solidFill>
-                    <a:srgbClr val="646365"/>
-                  </a:solidFill>
-                  <a:latin typeface="Helvetica" pitchFamily="34" charset="0"/>
-                  <a:ea typeface="Helvetica" pitchFamily="34" charset="-122"/>
-                  <a:cs typeface="Helvetica" pitchFamily="34" charset="-120"/>
-                </a:rPr>
-                <a:t>ALERT NOTIFICATION</a:t>
-              </a:r>
-              <a:endParaRPr lang="en-US" dirty="0"/>
-            </a:p>
-          </p:txBody>
-        </p:sp>
-      </p:grpSp>
-      <p:grpSp>
-        <p:nvGrpSpPr>
-          <p:cNvPr id="9" name="Group 8">
-            <a:extLst>
-              <a:ext uri="{FF2B5EF4-FFF2-40B4-BE49-F238E27FC236}">
-                <a16:creationId xmlns:a16="http://schemas.microsoft.com/office/drawing/2014/main" id="{3B7E0A3F-B58F-43F2-ADB7-8D2B6BA39D67}"/>
-              </a:ext>
-            </a:extLst>
-          </p:cNvPr>
-          <p:cNvGrpSpPr/>
-          <p:nvPr/>
-        </p:nvGrpSpPr>
-        <p:grpSpPr>
-          <a:xfrm>
-            <a:off x="6749139" y="2909284"/>
-            <a:ext cx="457200" cy="457200"/>
-            <a:chOff x="9082031" y="2681918"/>
-            <a:chExt cx="457200" cy="457200"/>
-          </a:xfrm>
-        </p:grpSpPr>
-        <p:sp>
-          <p:nvSpPr>
-            <p:cNvPr id="233" name="Object 92">
-              <a:extLst>
-                <a:ext uri="{FF2B5EF4-FFF2-40B4-BE49-F238E27FC236}">
-                  <a16:creationId xmlns:a16="http://schemas.microsoft.com/office/drawing/2014/main" id="{A41F67CC-3EBB-4C9A-9FED-3FC23309CA13}"/>
-                </a:ext>
-              </a:extLst>
-            </p:cNvPr>
-            <p:cNvSpPr/>
-            <p:nvPr/>
-          </p:nvSpPr>
-          <p:spPr>
-            <a:xfrm>
-              <a:off x="9082031" y="2681918"/>
-              <a:ext cx="457200" cy="457200"/>
-            </a:xfrm>
-            <a:prstGeom prst="ellipse">
-              <a:avLst/>
-            </a:prstGeom>
-            <a:solidFill>
-              <a:srgbClr val="FFFFFF"/>
-            </a:solidFill>
-            <a:ln w="19050">
-              <a:solidFill>
-                <a:srgbClr val="646365"/>
-              </a:solidFill>
-              <a:prstDash val="solid"/>
-            </a:ln>
-          </p:spPr>
-        </p:sp>
-        <p:pic>
-          <p:nvPicPr>
-            <p:cNvPr id="251" name="Object 93" descr="public/generated/icons/cc56b926-cfa1-4f50-ab9d-01986ff692be.png">
-              <a:extLst>
-                <a:ext uri="{FF2B5EF4-FFF2-40B4-BE49-F238E27FC236}">
-                  <a16:creationId xmlns:a16="http://schemas.microsoft.com/office/drawing/2014/main" id="{B278BB87-3AC1-423B-A4CE-2918030EE3E4}"/>
-                </a:ext>
-              </a:extLst>
-            </p:cNvPr>
-            <p:cNvPicPr>
-              <a:picLocks noChangeAspect="1"/>
-            </p:cNvPicPr>
-            <p:nvPr/>
-          </p:nvPicPr>
-          <p:blipFill>
-            <a:blip r:embed="rId12"/>
-            <a:stretch>
-              <a:fillRect/>
-            </a:stretch>
-          </p:blipFill>
-          <p:spPr>
-            <a:xfrm>
-              <a:off x="9173471" y="2773358"/>
-              <a:ext cx="274320" cy="274320"/>
-            </a:xfrm>
-            <a:prstGeom prst="rect">
-              <a:avLst/>
-            </a:prstGeom>
-          </p:spPr>
-        </p:pic>
-      </p:grpSp>
-      <p:sp>
-        <p:nvSpPr>
           <p:cNvPr id="290" name="Rectangle: Rounded Corners 289">
             <a:extLst>
               <a:ext uri="{FF2B5EF4-FFF2-40B4-BE49-F238E27FC236}">
@@ -17132,7 +16503,7 @@
             <p:nvPr/>
           </p:nvPicPr>
           <p:blipFill>
-            <a:blip r:embed="rId13"/>
+            <a:blip r:embed="rId11"/>
             <a:stretch>
               <a:fillRect/>
             </a:stretch>
@@ -17163,7 +16534,7 @@
           <p:nvPr/>
         </p:nvPicPr>
         <p:blipFill>
-          <a:blip r:embed="rId14"/>
+          <a:blip r:embed="rId12"/>
           <a:stretch>
             <a:fillRect/>
           </a:stretch>
@@ -18235,7 +17606,7 @@
             <p:nvPr/>
           </p:nvPicPr>
           <p:blipFill>
-            <a:blip r:embed="rId15"/>
+            <a:blip r:embed="rId13"/>
             <a:stretch>
               <a:fillRect/>
             </a:stretch>
@@ -18525,52 +17896,6 @@
           </a:p>
         </p:txBody>
       </p:sp>
-      <p:sp>
-        <p:nvSpPr>
-          <p:cNvPr id="119" name="Object 47">
-            <a:extLst>
-              <a:ext uri="{FF2B5EF4-FFF2-40B4-BE49-F238E27FC236}">
-                <a16:creationId xmlns:a16="http://schemas.microsoft.com/office/drawing/2014/main" id="{573183A7-D45B-4A23-902F-1FB2ACEA746E}"/>
-              </a:ext>
-            </a:extLst>
-          </p:cNvPr>
-          <p:cNvSpPr/>
-          <p:nvPr/>
-        </p:nvSpPr>
-        <p:spPr>
-          <a:xfrm>
-            <a:off x="7442825" y="4729250"/>
-            <a:ext cx="965157" cy="184666"/>
-          </a:xfrm>
-          <a:prstGeom prst="rect">
-            <a:avLst/>
-          </a:prstGeom>
-          <a:noFill/>
-        </p:spPr>
-        <p:txBody>
-          <a:bodyPr wrap="square" lIns="0" tIns="0" rIns="0" bIns="0" rtlCol="0" anchor="t">
-            <a:spAutoFit/>
-          </a:bodyPr>
-          <a:lstStyle/>
-          <a:p>
-            <a:pPr algn="ctr">
-              <a:buNone/>
-            </a:pPr>
-            <a:r>
-              <a:rPr lang="en-US" sz="600" b="1" dirty="0">
-                <a:solidFill>
-                  <a:srgbClr val="646365"/>
-                </a:solidFill>
-                <a:latin typeface="Helvetica" pitchFamily="34" charset="0"/>
-                <a:ea typeface="Helvetica" pitchFamily="34" charset="-122"/>
-                <a:cs typeface="Helvetica" pitchFamily="34" charset="-120"/>
-              </a:rPr>
-              <a:t>CERTIFICATE MANAGER SERVICES</a:t>
-            </a:r>
-            <a:endParaRPr lang="en-US" dirty="0"/>
-          </a:p>
-        </p:txBody>
-      </p:sp>
       <p:cxnSp>
         <p:nvCxnSpPr>
           <p:cNvPr id="36" name="Straight Arrow Connector 35">
@@ -18700,12 +18025,109 @@
           </a:fontRef>
         </p:style>
       </p:cxnSp>
+      <p:cxnSp>
+        <p:nvCxnSpPr>
+          <p:cNvPr id="60" name="Connector: Curved 59">
+            <a:extLst>
+              <a:ext uri="{FF2B5EF4-FFF2-40B4-BE49-F238E27FC236}">
+                <a16:creationId xmlns:a16="http://schemas.microsoft.com/office/drawing/2014/main" id="{94339B3A-CBB0-4E08-8EE5-C07A9E3CB41B}"/>
+              </a:ext>
+            </a:extLst>
+          </p:cNvPr>
+          <p:cNvCxnSpPr>
+            <a:cxnSpLocks/>
+          </p:cNvCxnSpPr>
+          <p:nvPr/>
+        </p:nvCxnSpPr>
+        <p:spPr>
+          <a:xfrm>
+            <a:off x="4394856" y="2651069"/>
+            <a:ext cx="2421238" cy="648460"/>
+          </a:xfrm>
+          <a:prstGeom prst="curvedConnector4">
+            <a:avLst>
+              <a:gd name="adj1" fmla="val 16395"/>
+              <a:gd name="adj2" fmla="val 135253"/>
+            </a:avLst>
+          </a:prstGeom>
+          <a:ln w="9525" cap="flat" cmpd="sng" algn="ctr">
+            <a:solidFill>
+              <a:schemeClr val="accent6"/>
+            </a:solidFill>
+            <a:prstDash val="dash"/>
+            <a:round/>
+            <a:headEnd type="none" w="med" len="med"/>
+            <a:tailEnd type="none" w="med" len="med"/>
+          </a:ln>
+        </p:spPr>
+        <p:style>
+          <a:lnRef idx="0">
+            <a:scrgbClr r="0" g="0" b="0"/>
+          </a:lnRef>
+          <a:fillRef idx="0">
+            <a:scrgbClr r="0" g="0" b="0"/>
+          </a:fillRef>
+          <a:effectRef idx="0">
+            <a:scrgbClr r="0" g="0" b="0"/>
+          </a:effectRef>
+          <a:fontRef idx="minor">
+            <a:schemeClr val="tx1"/>
+          </a:fontRef>
+        </p:style>
+      </p:cxnSp>
+      <p:sp>
+        <p:nvSpPr>
+          <p:cNvPr id="112" name="Rectangle: Rounded Corners 111">
+            <a:extLst>
+              <a:ext uri="{FF2B5EF4-FFF2-40B4-BE49-F238E27FC236}">
+                <a16:creationId xmlns:a16="http://schemas.microsoft.com/office/drawing/2014/main" id="{025011A0-2299-44B5-AEF5-9AF07DE2FD85}"/>
+              </a:ext>
+            </a:extLst>
+          </p:cNvPr>
+          <p:cNvSpPr/>
+          <p:nvPr/>
+        </p:nvSpPr>
+        <p:spPr>
+          <a:xfrm>
+            <a:off x="6963458" y="3220204"/>
+            <a:ext cx="1838966" cy="921650"/>
+          </a:xfrm>
+          <a:prstGeom prst="roundRect">
+            <a:avLst/>
+          </a:prstGeom>
+          <a:noFill/>
+        </p:spPr>
+        <p:style>
+          <a:lnRef idx="2">
+            <a:schemeClr val="accent1">
+              <a:shade val="50000"/>
+            </a:schemeClr>
+          </a:lnRef>
+          <a:fillRef idx="1">
+            <a:schemeClr val="accent1"/>
+          </a:fillRef>
+          <a:effectRef idx="0">
+            <a:schemeClr val="accent1"/>
+          </a:effectRef>
+          <a:fontRef idx="minor">
+            <a:schemeClr val="lt1"/>
+          </a:fontRef>
+        </p:style>
+        <p:txBody>
+          <a:bodyPr rtlCol="0" anchor="ctr"/>
+          <a:lstStyle/>
+          <a:p>
+            <a:pPr algn="ctr"/>
+            <a:endParaRPr lang="en-US"/>
+          </a:p>
+        </p:txBody>
+      </p:sp>
       <p:grpSp>
         <p:nvGrpSpPr>
-          <p:cNvPr id="55" name="Group 54">
-            <a:extLst>
-              <a:ext uri="{FF2B5EF4-FFF2-40B4-BE49-F238E27FC236}">
-                <a16:creationId xmlns:a16="http://schemas.microsoft.com/office/drawing/2014/main" id="{B68D7323-BDB6-412F-9747-D06E5DEFA59B}"/>
+          <p:cNvPr id="114" name="Group 113">
+            <a:extLst>
+              <a:ext uri="{FF2B5EF4-FFF2-40B4-BE49-F238E27FC236}">
+                <a16:creationId xmlns:a16="http://schemas.microsoft.com/office/drawing/2014/main" id="{325B1DF8-7ADA-4730-A566-C0D3E8E6CF83}"/>
               </a:ext>
             </a:extLst>
           </p:cNvPr>
@@ -18714,7 +18136,181 @@
         </p:nvGrpSpPr>
         <p:grpSpPr>
           <a:xfrm>
-            <a:off x="7194828" y="3914551"/>
+            <a:off x="7196580" y="3325845"/>
+            <a:ext cx="640080" cy="777240"/>
+            <a:chOff x="7900278" y="3572277"/>
+            <a:chExt cx="640080" cy="777240"/>
+          </a:xfrm>
+        </p:grpSpPr>
+        <p:sp>
+          <p:nvSpPr>
+            <p:cNvPr id="115" name="Object 70">
+              <a:extLst>
+                <a:ext uri="{FF2B5EF4-FFF2-40B4-BE49-F238E27FC236}">
+                  <a16:creationId xmlns:a16="http://schemas.microsoft.com/office/drawing/2014/main" id="{EAF53A32-02B9-4B10-8D57-8BC8853808D0}"/>
+                </a:ext>
+              </a:extLst>
+            </p:cNvPr>
+            <p:cNvSpPr/>
+            <p:nvPr/>
+          </p:nvSpPr>
+          <p:spPr>
+            <a:xfrm>
+              <a:off x="7991718" y="3572277"/>
+              <a:ext cx="457200" cy="457200"/>
+            </a:xfrm>
+            <a:prstGeom prst="ellipse">
+              <a:avLst/>
+            </a:prstGeom>
+            <a:solidFill>
+              <a:srgbClr val="FFFFFF"/>
+            </a:solidFill>
+            <a:ln w="19050">
+              <a:solidFill>
+                <a:srgbClr val="646365"/>
+              </a:solidFill>
+              <a:prstDash val="solid"/>
+            </a:ln>
+          </p:spPr>
+        </p:sp>
+        <p:pic>
+          <p:nvPicPr>
+            <p:cNvPr id="116" name="Object 71" descr="icons/namedsvg/API.png">
+              <a:extLst>
+                <a:ext uri="{FF2B5EF4-FFF2-40B4-BE49-F238E27FC236}">
+                  <a16:creationId xmlns:a16="http://schemas.microsoft.com/office/drawing/2014/main" id="{9E72B60D-9249-470C-9DB5-63C3816A3A46}"/>
+                </a:ext>
+              </a:extLst>
+            </p:cNvPr>
+            <p:cNvPicPr>
+              <a:picLocks noChangeAspect="1"/>
+            </p:cNvPicPr>
+            <p:nvPr/>
+          </p:nvPicPr>
+          <p:blipFill>
+            <a:blip r:embed="rId10"/>
+            <a:stretch>
+              <a:fillRect/>
+            </a:stretch>
+          </p:blipFill>
+          <p:spPr>
+            <a:xfrm>
+              <a:off x="8083158" y="3663717"/>
+              <a:ext cx="274320" cy="274320"/>
+            </a:xfrm>
+            <a:prstGeom prst="rect">
+              <a:avLst/>
+            </a:prstGeom>
+          </p:spPr>
+        </p:pic>
+        <p:sp>
+          <p:nvSpPr>
+            <p:cNvPr id="120" name="Object 72">
+              <a:extLst>
+                <a:ext uri="{FF2B5EF4-FFF2-40B4-BE49-F238E27FC236}">
+                  <a16:creationId xmlns:a16="http://schemas.microsoft.com/office/drawing/2014/main" id="{A76AE61F-D040-4F75-9ABE-FB6CC78D7E7E}"/>
+                </a:ext>
+              </a:extLst>
+            </p:cNvPr>
+            <p:cNvSpPr/>
+            <p:nvPr/>
+          </p:nvSpPr>
+          <p:spPr>
+            <a:xfrm>
+              <a:off x="7900278" y="4075197"/>
+              <a:ext cx="640080" cy="274320"/>
+            </a:xfrm>
+            <a:prstGeom prst="rect">
+              <a:avLst/>
+            </a:prstGeom>
+            <a:noFill/>
+          </p:spPr>
+          <p:txBody>
+            <a:bodyPr wrap="square" lIns="0" tIns="0" rIns="0" bIns="0" rtlCol="0" anchor="t">
+              <a:spAutoFit/>
+            </a:bodyPr>
+            <a:lstStyle/>
+            <a:p>
+              <a:pPr algn="ctr">
+                <a:buNone/>
+              </a:pPr>
+              <a:r>
+                <a:rPr lang="en-US" sz="600" b="1" dirty="0">
+                  <a:solidFill>
+                    <a:srgbClr val="646365"/>
+                  </a:solidFill>
+                  <a:latin typeface="Helvetica" pitchFamily="34" charset="0"/>
+                  <a:ea typeface="Helvetica" pitchFamily="34" charset="-122"/>
+                  <a:cs typeface="Helvetica" pitchFamily="34" charset="-120"/>
+                </a:rPr>
+                <a:t>API</a:t>
+              </a:r>
+              <a:endParaRPr lang="en-US" dirty="0"/>
+            </a:p>
+          </p:txBody>
+        </p:sp>
+      </p:grpSp>
+      <p:sp>
+        <p:nvSpPr>
+          <p:cNvPr id="136" name="Object 47">
+            <a:extLst>
+              <a:ext uri="{FF2B5EF4-FFF2-40B4-BE49-F238E27FC236}">
+                <a16:creationId xmlns:a16="http://schemas.microsoft.com/office/drawing/2014/main" id="{C10C8B92-70D9-4A1D-BEE2-59921355857A}"/>
+              </a:ext>
+            </a:extLst>
+          </p:cNvPr>
+          <p:cNvSpPr/>
+          <p:nvPr/>
+        </p:nvSpPr>
+        <p:spPr>
+          <a:xfrm>
+            <a:off x="7472264" y="4207833"/>
+            <a:ext cx="965157" cy="184666"/>
+          </a:xfrm>
+          <a:prstGeom prst="rect">
+            <a:avLst/>
+          </a:prstGeom>
+          <a:noFill/>
+        </p:spPr>
+        <p:txBody>
+          <a:bodyPr wrap="square" lIns="0" tIns="0" rIns="0" bIns="0" rtlCol="0" anchor="t">
+            <a:spAutoFit/>
+          </a:bodyPr>
+          <a:lstStyle/>
+          <a:p>
+            <a:pPr algn="ctr">
+              <a:buNone/>
+            </a:pPr>
+            <a:r>
+              <a:rPr lang="en-US" sz="600" b="1" dirty="0">
+                <a:solidFill>
+                  <a:srgbClr val="646365"/>
+                </a:solidFill>
+                <a:latin typeface="Helvetica" pitchFamily="34" charset="0"/>
+                <a:ea typeface="Helvetica" pitchFamily="34" charset="-122"/>
+                <a:cs typeface="Helvetica" pitchFamily="34" charset="-120"/>
+              </a:rPr>
+              <a:t>SECRETS MANAGER SERVICES</a:t>
+            </a:r>
+            <a:endParaRPr lang="en-US" dirty="0"/>
+          </a:p>
+        </p:txBody>
+      </p:sp>
+      <p:grpSp>
+        <p:nvGrpSpPr>
+          <p:cNvPr id="156" name="Group 155">
+            <a:extLst>
+              <a:ext uri="{FF2B5EF4-FFF2-40B4-BE49-F238E27FC236}">
+                <a16:creationId xmlns:a16="http://schemas.microsoft.com/office/drawing/2014/main" id="{1D489D96-A267-457A-9BD9-AA50366A4DA1}"/>
+              </a:ext>
+            </a:extLst>
+          </p:cNvPr>
+          <p:cNvGrpSpPr/>
+          <p:nvPr/>
+        </p:nvGrpSpPr>
+        <p:grpSpPr>
+          <a:xfrm>
+            <a:off x="8018981" y="3329100"/>
             <a:ext cx="640080" cy="777240"/>
             <a:chOff x="182880" y="1371600"/>
             <a:chExt cx="640080" cy="777240"/>
@@ -18722,10 +18318,10 @@
         </p:grpSpPr>
         <p:sp>
           <p:nvSpPr>
-            <p:cNvPr id="137" name="Object 28">
+            <p:cNvPr id="157" name="Object 28">
               <a:extLst>
                 <a:ext uri="{FF2B5EF4-FFF2-40B4-BE49-F238E27FC236}">
-                  <a16:creationId xmlns:a16="http://schemas.microsoft.com/office/drawing/2014/main" id="{8EFB818A-CA1F-488E-B3D0-0BFFA06C3B65}"/>
+                  <a16:creationId xmlns:a16="http://schemas.microsoft.com/office/drawing/2014/main" id="{714BF5D1-57E2-4D93-ABEF-48AC9A272819}"/>
                 </a:ext>
               </a:extLst>
             </p:cNvPr>
@@ -18753,10 +18349,10 @@
         </p:sp>
         <p:pic>
           <p:nvPicPr>
-            <p:cNvPr id="138" name="Object 29" descr="public/generated/icons/19.png">
+            <p:cNvPr id="158" name="Object 29" descr="public/generated/icons/19.png">
               <a:extLst>
                 <a:ext uri="{FF2B5EF4-FFF2-40B4-BE49-F238E27FC236}">
-                  <a16:creationId xmlns:a16="http://schemas.microsoft.com/office/drawing/2014/main" id="{56694808-AD7C-4458-BF1C-C0A34C9B48EF}"/>
+                  <a16:creationId xmlns:a16="http://schemas.microsoft.com/office/drawing/2014/main" id="{7ED56189-951C-4815-87CD-8D89376872C6}"/>
                 </a:ext>
               </a:extLst>
             </p:cNvPr>
@@ -18766,7 +18362,7 @@
             <p:nvPr/>
           </p:nvPicPr>
           <p:blipFill>
-            <a:blip r:embed="rId16"/>
+            <a:blip r:embed="rId14"/>
             <a:stretch>
               <a:fillRect/>
             </a:stretch>
@@ -18783,10 +18379,10 @@
         </p:pic>
         <p:sp>
           <p:nvSpPr>
-            <p:cNvPr id="145" name="Object 30">
+            <p:cNvPr id="159" name="Object 30">
               <a:extLst>
                 <a:ext uri="{FF2B5EF4-FFF2-40B4-BE49-F238E27FC236}">
-                  <a16:creationId xmlns:a16="http://schemas.microsoft.com/office/drawing/2014/main" id="{D1AFD789-CE6B-45AB-B13E-5A8B4E784E74}"/>
+                  <a16:creationId xmlns:a16="http://schemas.microsoft.com/office/drawing/2014/main" id="{F22E339E-7235-4885-A755-8FF6FF84A320}"/>
                 </a:ext>
               </a:extLst>
             </p:cNvPr>
@@ -18828,57 +18424,95 @@
           </p:txBody>
         </p:sp>
       </p:grpSp>
-      <p:cxnSp>
-        <p:nvCxnSpPr>
-          <p:cNvPr id="60" name="Connector: Curved 59">
-            <a:extLst>
-              <a:ext uri="{FF2B5EF4-FFF2-40B4-BE49-F238E27FC236}">
-                <a16:creationId xmlns:a16="http://schemas.microsoft.com/office/drawing/2014/main" id="{94339B3A-CBB0-4E08-8EE5-C07A9E3CB41B}"/>
-              </a:ext>
-            </a:extLst>
-          </p:cNvPr>
-          <p:cNvCxnSpPr>
-            <a:cxnSpLocks/>
-            <a:endCxn id="233" idx="3"/>
-          </p:cNvCxnSpPr>
+      <p:grpSp>
+        <p:nvGrpSpPr>
+          <p:cNvPr id="160" name="Group 159">
+            <a:extLst>
+              <a:ext uri="{FF2B5EF4-FFF2-40B4-BE49-F238E27FC236}">
+                <a16:creationId xmlns:a16="http://schemas.microsoft.com/office/drawing/2014/main" id="{E086C390-4E51-4C19-A09C-0A61954D84E0}"/>
+              </a:ext>
+            </a:extLst>
+          </p:cNvPr>
+          <p:cNvGrpSpPr/>
           <p:nvPr/>
-        </p:nvCxnSpPr>
-        <p:spPr>
+        </p:nvGrpSpPr>
+        <p:grpSpPr>
           <a:xfrm>
-            <a:off x="4394856" y="2651069"/>
-            <a:ext cx="2421238" cy="648460"/>
-          </a:xfrm>
-          <a:prstGeom prst="curvedConnector4">
-            <a:avLst>
-              <a:gd name="adj1" fmla="val 16395"/>
-              <a:gd name="adj2" fmla="val 135253"/>
-            </a:avLst>
-          </a:prstGeom>
-          <a:ln w="9525" cap="flat" cmpd="sng" algn="ctr">
+            <a:off x="6801451" y="3056020"/>
+            <a:ext cx="457200" cy="457200"/>
+            <a:chOff x="7141131" y="5696502"/>
+            <a:chExt cx="457200" cy="457200"/>
+          </a:xfrm>
+        </p:grpSpPr>
+        <p:sp>
+          <p:nvSpPr>
+            <p:cNvPr id="161" name="Object 100">
+              <a:extLst>
+                <a:ext uri="{FF2B5EF4-FFF2-40B4-BE49-F238E27FC236}">
+                  <a16:creationId xmlns:a16="http://schemas.microsoft.com/office/drawing/2014/main" id="{8B184A42-DB1D-4F39-BC2D-AE79E3D264FB}"/>
+                </a:ext>
+              </a:extLst>
+            </p:cNvPr>
+            <p:cNvSpPr/>
+            <p:nvPr/>
+          </p:nvSpPr>
+          <p:spPr>
+            <a:xfrm>
+              <a:off x="7141131" y="5696502"/>
+              <a:ext cx="457200" cy="457200"/>
+            </a:xfrm>
+            <a:prstGeom prst="ellipse">
+              <a:avLst/>
+            </a:prstGeom>
             <a:solidFill>
-              <a:schemeClr val="accent6"/>
+              <a:srgbClr val="FFFFFF"/>
             </a:solidFill>
-            <a:prstDash val="dash"/>
-            <a:round/>
-            <a:headEnd type="none" w="med" len="med"/>
-            <a:tailEnd type="none" w="med" len="med"/>
-          </a:ln>
-        </p:spPr>
-        <p:style>
-          <a:lnRef idx="0">
-            <a:scrgbClr r="0" g="0" b="0"/>
-          </a:lnRef>
-          <a:fillRef idx="0">
-            <a:scrgbClr r="0" g="0" b="0"/>
-          </a:fillRef>
-          <a:effectRef idx="0">
-            <a:scrgbClr r="0" g="0" b="0"/>
-          </a:effectRef>
-          <a:fontRef idx="minor">
-            <a:schemeClr val="tx1"/>
-          </a:fontRef>
-        </p:style>
-      </p:cxnSp>
+            <a:ln w="19050">
+              <a:solidFill>
+                <a:srgbClr val="646365"/>
+              </a:solidFill>
+              <a:prstDash val="solid"/>
+            </a:ln>
+          </p:spPr>
+          <p:txBody>
+            <a:bodyPr/>
+            <a:lstStyle/>
+            <a:p>
+              <a:endParaRPr lang="en-US"/>
+            </a:p>
+          </p:txBody>
+        </p:sp>
+        <p:pic>
+          <p:nvPicPr>
+            <p:cNvPr id="162" name="Object 101">
+              <a:extLst>
+                <a:ext uri="{FF2B5EF4-FFF2-40B4-BE49-F238E27FC236}">
+                  <a16:creationId xmlns:a16="http://schemas.microsoft.com/office/drawing/2014/main" id="{847C935E-DDDC-40E2-B1F3-881E4AEB80DB}"/>
+                </a:ext>
+              </a:extLst>
+            </p:cNvPr>
+            <p:cNvPicPr>
+              <a:picLocks noChangeAspect="1"/>
+            </p:cNvPicPr>
+            <p:nvPr/>
+          </p:nvPicPr>
+          <p:blipFill>
+            <a:blip r:embed="rId15"/>
+            <a:stretch>
+              <a:fillRect/>
+            </a:stretch>
+          </p:blipFill>
+          <p:spPr>
+            <a:xfrm>
+              <a:off x="7232571" y="5787942"/>
+              <a:ext cx="274320" cy="274320"/>
+            </a:xfrm>
+            <a:prstGeom prst="rect">
+              <a:avLst/>
+            </a:prstGeom>
+          </p:spPr>
+        </p:pic>
+      </p:grpSp>
     </p:spTree>
     <p:extLst>
       <p:ext uri="{BB962C8B-B14F-4D97-AF65-F5344CB8AC3E}">

</xml_diff>